<commit_message>
Inclusão da apresentação primeira e segunda aula, Exemplos de http-request
</commit_message>
<xml_diff>
--- a/presentation/object-oriented-javascript.pptx
+++ b/presentation/object-oriented-javascript.pptx
@@ -5,7 +5,7 @@
     <p:sldMasterId id="2147483648" r:id="rId1"/>
   </p:sldMasterIdLst>
   <p:notesMasterIdLst>
-    <p:notesMasterId r:id="rId12"/>
+    <p:notesMasterId r:id="rId20"/>
   </p:notesMasterIdLst>
   <p:sldIdLst>
     <p:sldId id="256" r:id="rId2"/>
@@ -18,6 +18,14 @@
     <p:sldId id="263" r:id="rId9"/>
     <p:sldId id="264" r:id="rId10"/>
     <p:sldId id="265" r:id="rId11"/>
+    <p:sldId id="266" r:id="rId12"/>
+    <p:sldId id="267" r:id="rId13"/>
+    <p:sldId id="268" r:id="rId14"/>
+    <p:sldId id="269" r:id="rId15"/>
+    <p:sldId id="270" r:id="rId16"/>
+    <p:sldId id="271" r:id="rId17"/>
+    <p:sldId id="272" r:id="rId18"/>
+    <p:sldId id="273" r:id="rId19"/>
   </p:sldIdLst>
   <p:sldSz cx="12192000" cy="6858000"/>
   <p:notesSz cx="6858000" cy="9144000"/>
@@ -698,6 +706,526 @@
 </p:notes>
 </file>
 
+<file path=ppt/notesSlides/notesSlide10.xml><?xml version="1.0" encoding="utf-8"?>
+<p:notes xmlns:a="http://schemas.openxmlformats.org/drawingml/2006/main" xmlns:r="http://schemas.openxmlformats.org/officeDocument/2006/relationships" xmlns:p="http://schemas.openxmlformats.org/presentationml/2006/main">
+  <p:cSld>
+    <p:spTree>
+      <p:nvGrpSpPr>
+        <p:cNvPr id="1" name=""/>
+        <p:cNvGrpSpPr/>
+        <p:nvPr/>
+      </p:nvGrpSpPr>
+      <p:grpSpPr>
+        <a:xfrm>
+          <a:off x="0" y="0"/>
+          <a:ext cx="0" cy="0"/>
+          <a:chOff x="0" y="0"/>
+          <a:chExt cx="0" cy="0"/>
+        </a:xfrm>
+      </p:grpSpPr>
+      <p:sp>
+        <p:nvSpPr>
+          <p:cNvPr id="2" name="Espaço Reservado para Imagem de Slide 1"/>
+          <p:cNvSpPr>
+            <a:spLocks noGrp="1" noRot="1" noChangeAspect="1"/>
+          </p:cNvSpPr>
+          <p:nvPr>
+            <p:ph type="sldImg"/>
+          </p:nvPr>
+        </p:nvSpPr>
+        <p:spPr/>
+      </p:sp>
+      <p:sp>
+        <p:nvSpPr>
+          <p:cNvPr id="3" name="Espaço Reservado para Anotações 2"/>
+          <p:cNvSpPr>
+            <a:spLocks noGrp="1"/>
+          </p:cNvSpPr>
+          <p:nvPr>
+            <p:ph type="body" idx="1"/>
+          </p:nvPr>
+        </p:nvSpPr>
+        <p:spPr/>
+        <p:txBody>
+          <a:bodyPr/>
+          <a:lstStyle/>
+          <a:p>
+            <a:endParaRPr lang="pt-BR" dirty="0"/>
+          </a:p>
+        </p:txBody>
+      </p:sp>
+      <p:sp>
+        <p:nvSpPr>
+          <p:cNvPr id="4" name="Espaço Reservado para Número de Slide 3"/>
+          <p:cNvSpPr>
+            <a:spLocks noGrp="1"/>
+          </p:cNvSpPr>
+          <p:nvPr>
+            <p:ph type="sldNum" sz="quarter" idx="10"/>
+          </p:nvPr>
+        </p:nvSpPr>
+        <p:spPr/>
+        <p:txBody>
+          <a:bodyPr/>
+          <a:lstStyle/>
+          <a:p>
+            <a:fld id="{2742B495-C90D-43EF-AAF4-2D8D9A9BDEDC}" type="slidenum">
+              <a:rPr lang="pt-BR" smtClean="0"/>
+              <a:t>12</a:t>
+            </a:fld>
+            <a:endParaRPr lang="pt-BR"/>
+          </a:p>
+        </p:txBody>
+      </p:sp>
+    </p:spTree>
+    <p:extLst>
+      <p:ext uri="{BB962C8B-B14F-4D97-AF65-F5344CB8AC3E}">
+        <p14:creationId xmlns:p14="http://schemas.microsoft.com/office/powerpoint/2010/main" val="2776567550"/>
+      </p:ext>
+    </p:extLst>
+  </p:cSld>
+  <p:clrMapOvr>
+    <a:masterClrMapping/>
+  </p:clrMapOvr>
+</p:notes>
+</file>
+
+<file path=ppt/notesSlides/notesSlide11.xml><?xml version="1.0" encoding="utf-8"?>
+<p:notes xmlns:a="http://schemas.openxmlformats.org/drawingml/2006/main" xmlns:r="http://schemas.openxmlformats.org/officeDocument/2006/relationships" xmlns:p="http://schemas.openxmlformats.org/presentationml/2006/main">
+  <p:cSld>
+    <p:spTree>
+      <p:nvGrpSpPr>
+        <p:cNvPr id="1" name=""/>
+        <p:cNvGrpSpPr/>
+        <p:nvPr/>
+      </p:nvGrpSpPr>
+      <p:grpSpPr>
+        <a:xfrm>
+          <a:off x="0" y="0"/>
+          <a:ext cx="0" cy="0"/>
+          <a:chOff x="0" y="0"/>
+          <a:chExt cx="0" cy="0"/>
+        </a:xfrm>
+      </p:grpSpPr>
+      <p:sp>
+        <p:nvSpPr>
+          <p:cNvPr id="2" name="Espaço Reservado para Imagem de Slide 1"/>
+          <p:cNvSpPr>
+            <a:spLocks noGrp="1" noRot="1" noChangeAspect="1"/>
+          </p:cNvSpPr>
+          <p:nvPr>
+            <p:ph type="sldImg"/>
+          </p:nvPr>
+        </p:nvSpPr>
+        <p:spPr/>
+      </p:sp>
+      <p:sp>
+        <p:nvSpPr>
+          <p:cNvPr id="3" name="Espaço Reservado para Anotações 2"/>
+          <p:cNvSpPr>
+            <a:spLocks noGrp="1"/>
+          </p:cNvSpPr>
+          <p:nvPr>
+            <p:ph type="body" idx="1"/>
+          </p:nvPr>
+        </p:nvSpPr>
+        <p:spPr/>
+        <p:txBody>
+          <a:bodyPr/>
+          <a:lstStyle/>
+          <a:p>
+            <a:endParaRPr lang="pt-BR" dirty="0"/>
+          </a:p>
+        </p:txBody>
+      </p:sp>
+      <p:sp>
+        <p:nvSpPr>
+          <p:cNvPr id="4" name="Espaço Reservado para Número de Slide 3"/>
+          <p:cNvSpPr>
+            <a:spLocks noGrp="1"/>
+          </p:cNvSpPr>
+          <p:nvPr>
+            <p:ph type="sldNum" sz="quarter" idx="10"/>
+          </p:nvPr>
+        </p:nvSpPr>
+        <p:spPr/>
+        <p:txBody>
+          <a:bodyPr/>
+          <a:lstStyle/>
+          <a:p>
+            <a:fld id="{2742B495-C90D-43EF-AAF4-2D8D9A9BDEDC}" type="slidenum">
+              <a:rPr lang="pt-BR" smtClean="0"/>
+              <a:t>13</a:t>
+            </a:fld>
+            <a:endParaRPr lang="pt-BR"/>
+          </a:p>
+        </p:txBody>
+      </p:sp>
+    </p:spTree>
+    <p:extLst>
+      <p:ext uri="{BB962C8B-B14F-4D97-AF65-F5344CB8AC3E}">
+        <p14:creationId xmlns:p14="http://schemas.microsoft.com/office/powerpoint/2010/main" val="3949274649"/>
+      </p:ext>
+    </p:extLst>
+  </p:cSld>
+  <p:clrMapOvr>
+    <a:masterClrMapping/>
+  </p:clrMapOvr>
+</p:notes>
+</file>
+
+<file path=ppt/notesSlides/notesSlide12.xml><?xml version="1.0" encoding="utf-8"?>
+<p:notes xmlns:a="http://schemas.openxmlformats.org/drawingml/2006/main" xmlns:r="http://schemas.openxmlformats.org/officeDocument/2006/relationships" xmlns:p="http://schemas.openxmlformats.org/presentationml/2006/main">
+  <p:cSld>
+    <p:spTree>
+      <p:nvGrpSpPr>
+        <p:cNvPr id="1" name=""/>
+        <p:cNvGrpSpPr/>
+        <p:nvPr/>
+      </p:nvGrpSpPr>
+      <p:grpSpPr>
+        <a:xfrm>
+          <a:off x="0" y="0"/>
+          <a:ext cx="0" cy="0"/>
+          <a:chOff x="0" y="0"/>
+          <a:chExt cx="0" cy="0"/>
+        </a:xfrm>
+      </p:grpSpPr>
+      <p:sp>
+        <p:nvSpPr>
+          <p:cNvPr id="2" name="Espaço Reservado para Imagem de Slide 1"/>
+          <p:cNvSpPr>
+            <a:spLocks noGrp="1" noRot="1" noChangeAspect="1"/>
+          </p:cNvSpPr>
+          <p:nvPr>
+            <p:ph type="sldImg"/>
+          </p:nvPr>
+        </p:nvSpPr>
+        <p:spPr/>
+      </p:sp>
+      <p:sp>
+        <p:nvSpPr>
+          <p:cNvPr id="3" name="Espaço Reservado para Anotações 2"/>
+          <p:cNvSpPr>
+            <a:spLocks noGrp="1"/>
+          </p:cNvSpPr>
+          <p:nvPr>
+            <p:ph type="body" idx="1"/>
+          </p:nvPr>
+        </p:nvSpPr>
+        <p:spPr/>
+        <p:txBody>
+          <a:bodyPr/>
+          <a:lstStyle/>
+          <a:p>
+            <a:endParaRPr lang="pt-BR" dirty="0"/>
+          </a:p>
+        </p:txBody>
+      </p:sp>
+      <p:sp>
+        <p:nvSpPr>
+          <p:cNvPr id="4" name="Espaço Reservado para Número de Slide 3"/>
+          <p:cNvSpPr>
+            <a:spLocks noGrp="1"/>
+          </p:cNvSpPr>
+          <p:nvPr>
+            <p:ph type="sldNum" sz="quarter" idx="10"/>
+          </p:nvPr>
+        </p:nvSpPr>
+        <p:spPr/>
+        <p:txBody>
+          <a:bodyPr/>
+          <a:lstStyle/>
+          <a:p>
+            <a:fld id="{2742B495-C90D-43EF-AAF4-2D8D9A9BDEDC}" type="slidenum">
+              <a:rPr lang="pt-BR" smtClean="0"/>
+              <a:t>14</a:t>
+            </a:fld>
+            <a:endParaRPr lang="pt-BR"/>
+          </a:p>
+        </p:txBody>
+      </p:sp>
+    </p:spTree>
+    <p:extLst>
+      <p:ext uri="{BB962C8B-B14F-4D97-AF65-F5344CB8AC3E}">
+        <p14:creationId xmlns:p14="http://schemas.microsoft.com/office/powerpoint/2010/main" val="243265099"/>
+      </p:ext>
+    </p:extLst>
+  </p:cSld>
+  <p:clrMapOvr>
+    <a:masterClrMapping/>
+  </p:clrMapOvr>
+</p:notes>
+</file>
+
+<file path=ppt/notesSlides/notesSlide13.xml><?xml version="1.0" encoding="utf-8"?>
+<p:notes xmlns:a="http://schemas.openxmlformats.org/drawingml/2006/main" xmlns:r="http://schemas.openxmlformats.org/officeDocument/2006/relationships" xmlns:p="http://schemas.openxmlformats.org/presentationml/2006/main">
+  <p:cSld>
+    <p:spTree>
+      <p:nvGrpSpPr>
+        <p:cNvPr id="1" name=""/>
+        <p:cNvGrpSpPr/>
+        <p:nvPr/>
+      </p:nvGrpSpPr>
+      <p:grpSpPr>
+        <a:xfrm>
+          <a:off x="0" y="0"/>
+          <a:ext cx="0" cy="0"/>
+          <a:chOff x="0" y="0"/>
+          <a:chExt cx="0" cy="0"/>
+        </a:xfrm>
+      </p:grpSpPr>
+      <p:sp>
+        <p:nvSpPr>
+          <p:cNvPr id="2" name="Espaço Reservado para Imagem de Slide 1"/>
+          <p:cNvSpPr>
+            <a:spLocks noGrp="1" noRot="1" noChangeAspect="1"/>
+          </p:cNvSpPr>
+          <p:nvPr>
+            <p:ph type="sldImg"/>
+          </p:nvPr>
+        </p:nvSpPr>
+        <p:spPr/>
+      </p:sp>
+      <p:sp>
+        <p:nvSpPr>
+          <p:cNvPr id="3" name="Espaço Reservado para Anotações 2"/>
+          <p:cNvSpPr>
+            <a:spLocks noGrp="1"/>
+          </p:cNvSpPr>
+          <p:nvPr>
+            <p:ph type="body" idx="1"/>
+          </p:nvPr>
+        </p:nvSpPr>
+        <p:spPr/>
+        <p:txBody>
+          <a:bodyPr/>
+          <a:lstStyle/>
+          <a:p>
+            <a:endParaRPr lang="pt-BR" dirty="0"/>
+          </a:p>
+        </p:txBody>
+      </p:sp>
+      <p:sp>
+        <p:nvSpPr>
+          <p:cNvPr id="4" name="Espaço Reservado para Número de Slide 3"/>
+          <p:cNvSpPr>
+            <a:spLocks noGrp="1"/>
+          </p:cNvSpPr>
+          <p:nvPr>
+            <p:ph type="sldNum" sz="quarter" idx="10"/>
+          </p:nvPr>
+        </p:nvSpPr>
+        <p:spPr/>
+        <p:txBody>
+          <a:bodyPr/>
+          <a:lstStyle/>
+          <a:p>
+            <a:fld id="{2742B495-C90D-43EF-AAF4-2D8D9A9BDEDC}" type="slidenum">
+              <a:rPr lang="pt-BR" smtClean="0"/>
+              <a:t>15</a:t>
+            </a:fld>
+            <a:endParaRPr lang="pt-BR"/>
+          </a:p>
+        </p:txBody>
+      </p:sp>
+    </p:spTree>
+    <p:extLst>
+      <p:ext uri="{BB962C8B-B14F-4D97-AF65-F5344CB8AC3E}">
+        <p14:creationId xmlns:p14="http://schemas.microsoft.com/office/powerpoint/2010/main" val="1865931310"/>
+      </p:ext>
+    </p:extLst>
+  </p:cSld>
+  <p:clrMapOvr>
+    <a:masterClrMapping/>
+  </p:clrMapOvr>
+</p:notes>
+</file>
+
+<file path=ppt/notesSlides/notesSlide14.xml><?xml version="1.0" encoding="utf-8"?>
+<p:notes xmlns:a="http://schemas.openxmlformats.org/drawingml/2006/main" xmlns:r="http://schemas.openxmlformats.org/officeDocument/2006/relationships" xmlns:p="http://schemas.openxmlformats.org/presentationml/2006/main">
+  <p:cSld>
+    <p:spTree>
+      <p:nvGrpSpPr>
+        <p:cNvPr id="1" name=""/>
+        <p:cNvGrpSpPr/>
+        <p:nvPr/>
+      </p:nvGrpSpPr>
+      <p:grpSpPr>
+        <a:xfrm>
+          <a:off x="0" y="0"/>
+          <a:ext cx="0" cy="0"/>
+          <a:chOff x="0" y="0"/>
+          <a:chExt cx="0" cy="0"/>
+        </a:xfrm>
+      </p:grpSpPr>
+      <p:sp>
+        <p:nvSpPr>
+          <p:cNvPr id="2" name="Espaço Reservado para Imagem de Slide 1"/>
+          <p:cNvSpPr>
+            <a:spLocks noGrp="1" noRot="1" noChangeAspect="1"/>
+          </p:cNvSpPr>
+          <p:nvPr>
+            <p:ph type="sldImg"/>
+          </p:nvPr>
+        </p:nvSpPr>
+        <p:spPr/>
+      </p:sp>
+      <p:sp>
+        <p:nvSpPr>
+          <p:cNvPr id="3" name="Espaço Reservado para Anotações 2"/>
+          <p:cNvSpPr>
+            <a:spLocks noGrp="1"/>
+          </p:cNvSpPr>
+          <p:nvPr>
+            <p:ph type="body" idx="1"/>
+          </p:nvPr>
+        </p:nvSpPr>
+        <p:spPr/>
+        <p:txBody>
+          <a:bodyPr/>
+          <a:lstStyle/>
+          <a:p>
+            <a:endParaRPr lang="pt-BR" dirty="0"/>
+          </a:p>
+        </p:txBody>
+      </p:sp>
+      <p:sp>
+        <p:nvSpPr>
+          <p:cNvPr id="4" name="Espaço Reservado para Número de Slide 3"/>
+          <p:cNvSpPr>
+            <a:spLocks noGrp="1"/>
+          </p:cNvSpPr>
+          <p:nvPr>
+            <p:ph type="sldNum" sz="quarter" idx="10"/>
+          </p:nvPr>
+        </p:nvSpPr>
+        <p:spPr/>
+        <p:txBody>
+          <a:bodyPr/>
+          <a:lstStyle/>
+          <a:p>
+            <a:fld id="{2742B495-C90D-43EF-AAF4-2D8D9A9BDEDC}" type="slidenum">
+              <a:rPr lang="pt-BR" smtClean="0"/>
+              <a:t>16</a:t>
+            </a:fld>
+            <a:endParaRPr lang="pt-BR"/>
+          </a:p>
+        </p:txBody>
+      </p:sp>
+    </p:spTree>
+    <p:extLst>
+      <p:ext uri="{BB962C8B-B14F-4D97-AF65-F5344CB8AC3E}">
+        <p14:creationId xmlns:p14="http://schemas.microsoft.com/office/powerpoint/2010/main" val="806471804"/>
+      </p:ext>
+    </p:extLst>
+  </p:cSld>
+  <p:clrMapOvr>
+    <a:masterClrMapping/>
+  </p:clrMapOvr>
+</p:notes>
+</file>
+
+<file path=ppt/notesSlides/notesSlide15.xml><?xml version="1.0" encoding="utf-8"?>
+<p:notes xmlns:a="http://schemas.openxmlformats.org/drawingml/2006/main" xmlns:r="http://schemas.openxmlformats.org/officeDocument/2006/relationships" xmlns:p="http://schemas.openxmlformats.org/presentationml/2006/main">
+  <p:cSld>
+    <p:spTree>
+      <p:nvGrpSpPr>
+        <p:cNvPr id="1" name=""/>
+        <p:cNvGrpSpPr/>
+        <p:nvPr/>
+      </p:nvGrpSpPr>
+      <p:grpSpPr>
+        <a:xfrm>
+          <a:off x="0" y="0"/>
+          <a:ext cx="0" cy="0"/>
+          <a:chOff x="0" y="0"/>
+          <a:chExt cx="0" cy="0"/>
+        </a:xfrm>
+      </p:grpSpPr>
+      <p:sp>
+        <p:nvSpPr>
+          <p:cNvPr id="2" name="Espaço Reservado para Imagem de Slide 1"/>
+          <p:cNvSpPr>
+            <a:spLocks noGrp="1" noRot="1" noChangeAspect="1"/>
+          </p:cNvSpPr>
+          <p:nvPr>
+            <p:ph type="sldImg"/>
+          </p:nvPr>
+        </p:nvSpPr>
+        <p:spPr/>
+      </p:sp>
+      <p:sp>
+        <p:nvSpPr>
+          <p:cNvPr id="3" name="Espaço Reservado para Anotações 2"/>
+          <p:cNvSpPr>
+            <a:spLocks noGrp="1"/>
+          </p:cNvSpPr>
+          <p:nvPr>
+            <p:ph type="body" idx="1"/>
+          </p:nvPr>
+        </p:nvSpPr>
+        <p:spPr/>
+        <p:txBody>
+          <a:bodyPr/>
+          <a:lstStyle/>
+          <a:p>
+            <a:r>
+              <a:rPr lang="pt-BR" dirty="0" smtClean="0"/>
+              <a:t>Lembrar</a:t>
+            </a:r>
+            <a:r>
+              <a:rPr lang="pt-BR" baseline="0" dirty="0" smtClean="0"/>
+              <a:t> aos alunos que os arquivos precisam ser rodados localmente para que a </a:t>
+            </a:r>
+            <a:r>
+              <a:rPr lang="pt-BR" baseline="0" dirty="0" err="1" smtClean="0"/>
+              <a:t>request</a:t>
+            </a:r>
+            <a:r>
+              <a:rPr lang="pt-BR" baseline="0" dirty="0" smtClean="0"/>
+              <a:t> funcione.</a:t>
+            </a:r>
+            <a:endParaRPr lang="pt-BR" dirty="0"/>
+          </a:p>
+        </p:txBody>
+      </p:sp>
+      <p:sp>
+        <p:nvSpPr>
+          <p:cNvPr id="4" name="Espaço Reservado para Número de Slide 3"/>
+          <p:cNvSpPr>
+            <a:spLocks noGrp="1"/>
+          </p:cNvSpPr>
+          <p:nvPr>
+            <p:ph type="sldNum" sz="quarter" idx="10"/>
+          </p:nvPr>
+        </p:nvSpPr>
+        <p:spPr/>
+        <p:txBody>
+          <a:bodyPr/>
+          <a:lstStyle/>
+          <a:p>
+            <a:fld id="{2742B495-C90D-43EF-AAF4-2D8D9A9BDEDC}" type="slidenum">
+              <a:rPr lang="pt-BR" smtClean="0"/>
+              <a:t>17</a:t>
+            </a:fld>
+            <a:endParaRPr lang="pt-BR"/>
+          </a:p>
+        </p:txBody>
+      </p:sp>
+    </p:spTree>
+    <p:extLst>
+      <p:ext uri="{BB962C8B-B14F-4D97-AF65-F5344CB8AC3E}">
+        <p14:creationId xmlns:p14="http://schemas.microsoft.com/office/powerpoint/2010/main" val="3989154238"/>
+      </p:ext>
+    </p:extLst>
+  </p:cSld>
+  <p:clrMapOvr>
+    <a:masterClrMapping/>
+  </p:clrMapOvr>
+</p:notes>
+</file>
+
 <file path=ppt/notesSlides/notesSlide2.xml><?xml version="1.0" encoding="utf-8"?>
 <p:notes xmlns:a="http://schemas.openxmlformats.org/drawingml/2006/main" xmlns:r="http://schemas.openxmlformats.org/officeDocument/2006/relationships" xmlns:p="http://schemas.openxmlformats.org/presentationml/2006/main">
   <p:cSld>
@@ -1458,7 +1986,6 @@
               <a:rPr lang="pt-BR" dirty="0"/>
               <a:t>http://jsfiddle.net/claudaniloxavier/6j867u61/2/</a:t>
             </a:r>
-            <a:endParaRPr lang="pt-BR" dirty="0"/>
           </a:p>
         </p:txBody>
       </p:sp>
@@ -1489,6 +2016,90 @@
     <p:extLst>
       <p:ext uri="{BB962C8B-B14F-4D97-AF65-F5344CB8AC3E}">
         <p14:creationId xmlns:p14="http://schemas.microsoft.com/office/powerpoint/2010/main" val="3630907983"/>
+      </p:ext>
+    </p:extLst>
+  </p:cSld>
+  <p:clrMapOvr>
+    <a:masterClrMapping/>
+  </p:clrMapOvr>
+</p:notes>
+</file>
+
+<file path=ppt/notesSlides/notesSlide9.xml><?xml version="1.0" encoding="utf-8"?>
+<p:notes xmlns:a="http://schemas.openxmlformats.org/drawingml/2006/main" xmlns:r="http://schemas.openxmlformats.org/officeDocument/2006/relationships" xmlns:p="http://schemas.openxmlformats.org/presentationml/2006/main">
+  <p:cSld>
+    <p:spTree>
+      <p:nvGrpSpPr>
+        <p:cNvPr id="1" name=""/>
+        <p:cNvGrpSpPr/>
+        <p:nvPr/>
+      </p:nvGrpSpPr>
+      <p:grpSpPr>
+        <a:xfrm>
+          <a:off x="0" y="0"/>
+          <a:ext cx="0" cy="0"/>
+          <a:chOff x="0" y="0"/>
+          <a:chExt cx="0" cy="0"/>
+        </a:xfrm>
+      </p:grpSpPr>
+      <p:sp>
+        <p:nvSpPr>
+          <p:cNvPr id="2" name="Espaço Reservado para Imagem de Slide 1"/>
+          <p:cNvSpPr>
+            <a:spLocks noGrp="1" noRot="1" noChangeAspect="1"/>
+          </p:cNvSpPr>
+          <p:nvPr>
+            <p:ph type="sldImg"/>
+          </p:nvPr>
+        </p:nvSpPr>
+        <p:spPr/>
+      </p:sp>
+      <p:sp>
+        <p:nvSpPr>
+          <p:cNvPr id="3" name="Espaço Reservado para Anotações 2"/>
+          <p:cNvSpPr>
+            <a:spLocks noGrp="1"/>
+          </p:cNvSpPr>
+          <p:nvPr>
+            <p:ph type="body" idx="1"/>
+          </p:nvPr>
+        </p:nvSpPr>
+        <p:spPr/>
+        <p:txBody>
+          <a:bodyPr/>
+          <a:lstStyle/>
+          <a:p>
+            <a:endParaRPr lang="pt-BR" dirty="0"/>
+          </a:p>
+        </p:txBody>
+      </p:sp>
+      <p:sp>
+        <p:nvSpPr>
+          <p:cNvPr id="4" name="Espaço Reservado para Número de Slide 3"/>
+          <p:cNvSpPr>
+            <a:spLocks noGrp="1"/>
+          </p:cNvSpPr>
+          <p:nvPr>
+            <p:ph type="sldNum" sz="quarter" idx="10"/>
+          </p:nvPr>
+        </p:nvSpPr>
+        <p:spPr/>
+        <p:txBody>
+          <a:bodyPr/>
+          <a:lstStyle/>
+          <a:p>
+            <a:fld id="{2742B495-C90D-43EF-AAF4-2D8D9A9BDEDC}" type="slidenum">
+              <a:rPr lang="pt-BR" smtClean="0"/>
+              <a:t>11</a:t>
+            </a:fld>
+            <a:endParaRPr lang="pt-BR"/>
+          </a:p>
+        </p:txBody>
+      </p:sp>
+    </p:spTree>
+    <p:extLst>
+      <p:ext uri="{BB962C8B-B14F-4D97-AF65-F5344CB8AC3E}">
+        <p14:creationId xmlns:p14="http://schemas.microsoft.com/office/powerpoint/2010/main" val="3540829439"/>
       </p:ext>
     </p:extLst>
   </p:cSld>
@@ -15316,6 +15927,814 @@
     <p:extLst>
       <p:ext uri="{BB962C8B-B14F-4D97-AF65-F5344CB8AC3E}">
         <p14:creationId xmlns:p14="http://schemas.microsoft.com/office/powerpoint/2010/main" val="1672131556"/>
+      </p:ext>
+    </p:extLst>
+  </p:cSld>
+  <p:clrMapOvr>
+    <a:masterClrMapping/>
+  </p:clrMapOvr>
+</p:sld>
+</file>
+
+<file path=ppt/slides/slide11.xml><?xml version="1.0" encoding="utf-8"?>
+<p:sld xmlns:a="http://schemas.openxmlformats.org/drawingml/2006/main" xmlns:r="http://schemas.openxmlformats.org/officeDocument/2006/relationships" xmlns:p="http://schemas.openxmlformats.org/presentationml/2006/main">
+  <p:cSld>
+    <p:spTree>
+      <p:nvGrpSpPr>
+        <p:cNvPr id="1" name=""/>
+        <p:cNvGrpSpPr/>
+        <p:nvPr/>
+      </p:nvGrpSpPr>
+      <p:grpSpPr>
+        <a:xfrm>
+          <a:off x="0" y="0"/>
+          <a:ext cx="0" cy="0"/>
+          <a:chOff x="0" y="0"/>
+          <a:chExt cx="0" cy="0"/>
+        </a:xfrm>
+      </p:grpSpPr>
+      <p:sp>
+        <p:nvSpPr>
+          <p:cNvPr id="2" name="Título 1"/>
+          <p:cNvSpPr>
+            <a:spLocks noGrp="1"/>
+          </p:cNvSpPr>
+          <p:nvPr>
+            <p:ph type="title"/>
+          </p:nvPr>
+        </p:nvSpPr>
+        <p:spPr/>
+        <p:txBody>
+          <a:bodyPr/>
+          <a:lstStyle/>
+          <a:p>
+            <a:r>
+              <a:rPr lang="pt-BR" dirty="0" smtClean="0"/>
+              <a:t>XML </a:t>
+            </a:r>
+            <a:r>
+              <a:rPr lang="pt-BR" dirty="0" err="1" smtClean="0"/>
+              <a:t>HttpRequest</a:t>
+            </a:r>
+            <a:r>
+              <a:rPr lang="pt-BR" dirty="0" smtClean="0"/>
+              <a:t>	</a:t>
+            </a:r>
+            <a:endParaRPr lang="pt-BR" dirty="0"/>
+          </a:p>
+        </p:txBody>
+      </p:sp>
+      <p:sp>
+        <p:nvSpPr>
+          <p:cNvPr id="3" name="Espaço Reservado para Conteúdo 2"/>
+          <p:cNvSpPr>
+            <a:spLocks noGrp="1"/>
+          </p:cNvSpPr>
+          <p:nvPr>
+            <p:ph idx="1"/>
+          </p:nvPr>
+        </p:nvSpPr>
+        <p:spPr/>
+        <p:txBody>
+          <a:bodyPr/>
+          <a:lstStyle/>
+          <a:p>
+            <a:r>
+              <a:rPr lang="pt-BR" dirty="0" smtClean="0"/>
+              <a:t>É utilizado para fazer uma requisição de dados de um servidor</a:t>
+            </a:r>
+            <a:endParaRPr lang="pt-BR" dirty="0"/>
+          </a:p>
+          <a:p>
+            <a:r>
+              <a:rPr lang="pt-BR" dirty="0" smtClean="0"/>
+              <a:t>Atualizar uma pagina web sem recarregar a pagina</a:t>
+            </a:r>
+            <a:endParaRPr lang="pt-BR" dirty="0"/>
+          </a:p>
+          <a:p>
+            <a:r>
+              <a:rPr lang="pt-BR" dirty="0" smtClean="0"/>
+              <a:t>Fazer a requisição de um dado do servidor após a página ser carregada</a:t>
+            </a:r>
+            <a:endParaRPr lang="pt-BR" dirty="0"/>
+          </a:p>
+          <a:p>
+            <a:r>
+              <a:rPr lang="pt-BR" dirty="0" smtClean="0"/>
+              <a:t>Receber dados do servidor após a página ser carregada</a:t>
+            </a:r>
+            <a:endParaRPr lang="pt-BR" dirty="0"/>
+          </a:p>
+          <a:p>
+            <a:r>
+              <a:rPr lang="pt-BR" dirty="0" smtClean="0"/>
+              <a:t>Enviar dados para um servidor</a:t>
+            </a:r>
+            <a:endParaRPr lang="pt-BR" dirty="0"/>
+          </a:p>
+        </p:txBody>
+      </p:sp>
+    </p:spTree>
+    <p:extLst>
+      <p:ext uri="{BB962C8B-B14F-4D97-AF65-F5344CB8AC3E}">
+        <p14:creationId xmlns:p14="http://schemas.microsoft.com/office/powerpoint/2010/main" val="1364086506"/>
+      </p:ext>
+    </p:extLst>
+  </p:cSld>
+  <p:clrMapOvr>
+    <a:masterClrMapping/>
+  </p:clrMapOvr>
+</p:sld>
+</file>
+
+<file path=ppt/slides/slide12.xml><?xml version="1.0" encoding="utf-8"?>
+<p:sld xmlns:a="http://schemas.openxmlformats.org/drawingml/2006/main" xmlns:r="http://schemas.openxmlformats.org/officeDocument/2006/relationships" xmlns:p="http://schemas.openxmlformats.org/presentationml/2006/main">
+  <p:cSld>
+    <p:spTree>
+      <p:nvGrpSpPr>
+        <p:cNvPr id="1" name=""/>
+        <p:cNvGrpSpPr/>
+        <p:nvPr/>
+      </p:nvGrpSpPr>
+      <p:grpSpPr>
+        <a:xfrm>
+          <a:off x="0" y="0"/>
+          <a:ext cx="0" cy="0"/>
+          <a:chOff x="0" y="0"/>
+          <a:chExt cx="0" cy="0"/>
+        </a:xfrm>
+      </p:grpSpPr>
+      <p:sp>
+        <p:nvSpPr>
+          <p:cNvPr id="2" name="Título 1"/>
+          <p:cNvSpPr>
+            <a:spLocks noGrp="1"/>
+          </p:cNvSpPr>
+          <p:nvPr>
+            <p:ph type="title"/>
+          </p:nvPr>
+        </p:nvSpPr>
+        <p:spPr/>
+        <p:txBody>
+          <a:bodyPr/>
+          <a:lstStyle/>
+          <a:p>
+            <a:r>
+              <a:rPr lang="pt-BR" dirty="0" smtClean="0"/>
+              <a:t>Exemplo</a:t>
+            </a:r>
+            <a:endParaRPr lang="pt-BR" dirty="0"/>
+          </a:p>
+        </p:txBody>
+      </p:sp>
+      <p:pic>
+        <p:nvPicPr>
+          <p:cNvPr id="5" name="Espaço Reservado para Conteúdo 4"/>
+          <p:cNvPicPr>
+            <a:picLocks noGrp="1" noChangeAspect="1"/>
+          </p:cNvPicPr>
+          <p:nvPr>
+            <p:ph idx="1"/>
+          </p:nvPr>
+        </p:nvPicPr>
+        <p:blipFill>
+          <a:blip r:embed="rId3"/>
+          <a:stretch>
+            <a:fillRect/>
+          </a:stretch>
+        </p:blipFill>
+        <p:spPr>
+          <a:xfrm>
+            <a:off x="1273221" y="2727994"/>
+            <a:ext cx="8524875" cy="2686050"/>
+          </a:xfrm>
+          <a:prstGeom prst="rect">
+            <a:avLst/>
+          </a:prstGeom>
+        </p:spPr>
+      </p:pic>
+    </p:spTree>
+    <p:extLst>
+      <p:ext uri="{BB962C8B-B14F-4D97-AF65-F5344CB8AC3E}">
+        <p14:creationId xmlns:p14="http://schemas.microsoft.com/office/powerpoint/2010/main" val="3648305958"/>
+      </p:ext>
+    </p:extLst>
+  </p:cSld>
+  <p:clrMapOvr>
+    <a:masterClrMapping/>
+  </p:clrMapOvr>
+</p:sld>
+</file>
+
+<file path=ppt/slides/slide13.xml><?xml version="1.0" encoding="utf-8"?>
+<p:sld xmlns:a="http://schemas.openxmlformats.org/drawingml/2006/main" xmlns:r="http://schemas.openxmlformats.org/officeDocument/2006/relationships" xmlns:p="http://schemas.openxmlformats.org/presentationml/2006/main">
+  <p:cSld>
+    <p:spTree>
+      <p:nvGrpSpPr>
+        <p:cNvPr id="1" name=""/>
+        <p:cNvGrpSpPr/>
+        <p:nvPr/>
+      </p:nvGrpSpPr>
+      <p:grpSpPr>
+        <a:xfrm>
+          <a:off x="0" y="0"/>
+          <a:ext cx="0" cy="0"/>
+          <a:chOff x="0" y="0"/>
+          <a:chExt cx="0" cy="0"/>
+        </a:xfrm>
+      </p:grpSpPr>
+      <p:sp>
+        <p:nvSpPr>
+          <p:cNvPr id="2" name="Título 1"/>
+          <p:cNvSpPr>
+            <a:spLocks noGrp="1"/>
+          </p:cNvSpPr>
+          <p:nvPr>
+            <p:ph type="title"/>
+          </p:nvPr>
+        </p:nvSpPr>
+        <p:spPr/>
+        <p:txBody>
+          <a:bodyPr/>
+          <a:lstStyle/>
+          <a:p>
+            <a:r>
+              <a:rPr lang="pt-BR" dirty="0" smtClean="0"/>
+              <a:t>Exemplo</a:t>
+            </a:r>
+            <a:endParaRPr lang="pt-BR" dirty="0"/>
+          </a:p>
+        </p:txBody>
+      </p:sp>
+      <p:sp>
+        <p:nvSpPr>
+          <p:cNvPr id="3" name="Espaço Reservado para Conteúdo 2"/>
+          <p:cNvSpPr>
+            <a:spLocks noGrp="1"/>
+          </p:cNvSpPr>
+          <p:nvPr>
+            <p:ph idx="1"/>
+          </p:nvPr>
+        </p:nvSpPr>
+        <p:spPr/>
+        <p:txBody>
+          <a:bodyPr/>
+          <a:lstStyle/>
+          <a:p>
+            <a:r>
+              <a:rPr lang="pt-BR" dirty="0" smtClean="0"/>
+              <a:t>A parte destacada cria um objeto </a:t>
+            </a:r>
+            <a:r>
+              <a:rPr lang="pt-BR" dirty="0" err="1" smtClean="0"/>
+              <a:t>XMLHttpRequest</a:t>
+            </a:r>
+            <a:endParaRPr lang="pt-BR" dirty="0"/>
+          </a:p>
+        </p:txBody>
+      </p:sp>
+      <p:pic>
+        <p:nvPicPr>
+          <p:cNvPr id="4" name="Imagem 3"/>
+          <p:cNvPicPr>
+            <a:picLocks noChangeAspect="1"/>
+          </p:cNvPicPr>
+          <p:nvPr/>
+        </p:nvPicPr>
+        <p:blipFill>
+          <a:blip r:embed="rId3"/>
+          <a:stretch>
+            <a:fillRect/>
+          </a:stretch>
+        </p:blipFill>
+        <p:spPr>
+          <a:xfrm>
+            <a:off x="1154953" y="3122194"/>
+            <a:ext cx="8820150" cy="2667000"/>
+          </a:xfrm>
+          <a:prstGeom prst="rect">
+            <a:avLst/>
+          </a:prstGeom>
+        </p:spPr>
+      </p:pic>
+    </p:spTree>
+    <p:extLst>
+      <p:ext uri="{BB962C8B-B14F-4D97-AF65-F5344CB8AC3E}">
+        <p14:creationId xmlns:p14="http://schemas.microsoft.com/office/powerpoint/2010/main" val="1230352774"/>
+      </p:ext>
+    </p:extLst>
+  </p:cSld>
+  <p:clrMapOvr>
+    <a:masterClrMapping/>
+  </p:clrMapOvr>
+</p:sld>
+</file>
+
+<file path=ppt/slides/slide14.xml><?xml version="1.0" encoding="utf-8"?>
+<p:sld xmlns:a="http://schemas.openxmlformats.org/drawingml/2006/main" xmlns:r="http://schemas.openxmlformats.org/officeDocument/2006/relationships" xmlns:p="http://schemas.openxmlformats.org/presentationml/2006/main">
+  <p:cSld>
+    <p:spTree>
+      <p:nvGrpSpPr>
+        <p:cNvPr id="1" name=""/>
+        <p:cNvGrpSpPr/>
+        <p:nvPr/>
+      </p:nvGrpSpPr>
+      <p:grpSpPr>
+        <a:xfrm>
+          <a:off x="0" y="0"/>
+          <a:ext cx="0" cy="0"/>
+          <a:chOff x="0" y="0"/>
+          <a:chExt cx="0" cy="0"/>
+        </a:xfrm>
+      </p:grpSpPr>
+      <p:sp>
+        <p:nvSpPr>
+          <p:cNvPr id="2" name="Título 1"/>
+          <p:cNvSpPr>
+            <a:spLocks noGrp="1"/>
+          </p:cNvSpPr>
+          <p:nvPr>
+            <p:ph type="title"/>
+          </p:nvPr>
+        </p:nvSpPr>
+        <p:spPr/>
+        <p:txBody>
+          <a:bodyPr/>
+          <a:lstStyle/>
+          <a:p>
+            <a:r>
+              <a:rPr lang="pt-BR" dirty="0" smtClean="0"/>
+              <a:t>Exemplo</a:t>
+            </a:r>
+            <a:endParaRPr lang="pt-BR" dirty="0"/>
+          </a:p>
+        </p:txBody>
+      </p:sp>
+      <p:sp>
+        <p:nvSpPr>
+          <p:cNvPr id="3" name="Espaço Reservado para Conteúdo 2"/>
+          <p:cNvSpPr>
+            <a:spLocks noGrp="1"/>
+          </p:cNvSpPr>
+          <p:nvPr>
+            <p:ph idx="1"/>
+          </p:nvPr>
+        </p:nvSpPr>
+        <p:spPr/>
+        <p:txBody>
+          <a:bodyPr/>
+          <a:lstStyle/>
+          <a:p>
+            <a:r>
+              <a:rPr lang="pt-BR" dirty="0" err="1" smtClean="0"/>
+              <a:t>Onreadystatechange</a:t>
+            </a:r>
+            <a:r>
+              <a:rPr lang="pt-BR" dirty="0" smtClean="0"/>
+              <a:t> especifica uma função que será executada toda vez que o status do </a:t>
+            </a:r>
+            <a:r>
+              <a:rPr lang="pt-BR" dirty="0" err="1" smtClean="0"/>
+              <a:t>XMLHttpRequest</a:t>
+            </a:r>
+            <a:r>
+              <a:rPr lang="pt-BR" dirty="0" smtClean="0"/>
+              <a:t> mudar.</a:t>
+            </a:r>
+            <a:endParaRPr lang="pt-BR" dirty="0"/>
+          </a:p>
+        </p:txBody>
+      </p:sp>
+      <p:pic>
+        <p:nvPicPr>
+          <p:cNvPr id="5" name="Imagem 4"/>
+          <p:cNvPicPr>
+            <a:picLocks noChangeAspect="1"/>
+          </p:cNvPicPr>
+          <p:nvPr/>
+        </p:nvPicPr>
+        <p:blipFill>
+          <a:blip r:embed="rId3"/>
+          <a:stretch>
+            <a:fillRect/>
+          </a:stretch>
+        </p:blipFill>
+        <p:spPr>
+          <a:xfrm>
+            <a:off x="1254171" y="3381375"/>
+            <a:ext cx="8562975" cy="2638425"/>
+          </a:xfrm>
+          <a:prstGeom prst="rect">
+            <a:avLst/>
+          </a:prstGeom>
+        </p:spPr>
+      </p:pic>
+    </p:spTree>
+    <p:extLst>
+      <p:ext uri="{BB962C8B-B14F-4D97-AF65-F5344CB8AC3E}">
+        <p14:creationId xmlns:p14="http://schemas.microsoft.com/office/powerpoint/2010/main" val="2351268256"/>
+      </p:ext>
+    </p:extLst>
+  </p:cSld>
+  <p:clrMapOvr>
+    <a:masterClrMapping/>
+  </p:clrMapOvr>
+</p:sld>
+</file>
+
+<file path=ppt/slides/slide15.xml><?xml version="1.0" encoding="utf-8"?>
+<p:sld xmlns:a="http://schemas.openxmlformats.org/drawingml/2006/main" xmlns:r="http://schemas.openxmlformats.org/officeDocument/2006/relationships" xmlns:p="http://schemas.openxmlformats.org/presentationml/2006/main">
+  <p:cSld>
+    <p:spTree>
+      <p:nvGrpSpPr>
+        <p:cNvPr id="1" name=""/>
+        <p:cNvGrpSpPr/>
+        <p:nvPr/>
+      </p:nvGrpSpPr>
+      <p:grpSpPr>
+        <a:xfrm>
+          <a:off x="0" y="0"/>
+          <a:ext cx="0" cy="0"/>
+          <a:chOff x="0" y="0"/>
+          <a:chExt cx="0" cy="0"/>
+        </a:xfrm>
+      </p:grpSpPr>
+      <p:sp>
+        <p:nvSpPr>
+          <p:cNvPr id="2" name="Título 1"/>
+          <p:cNvSpPr>
+            <a:spLocks noGrp="1"/>
+          </p:cNvSpPr>
+          <p:nvPr>
+            <p:ph type="title"/>
+          </p:nvPr>
+        </p:nvSpPr>
+        <p:spPr/>
+        <p:txBody>
+          <a:bodyPr/>
+          <a:lstStyle/>
+          <a:p>
+            <a:r>
+              <a:rPr lang="pt-BR" dirty="0" smtClean="0"/>
+              <a:t>Exemplo</a:t>
+            </a:r>
+            <a:endParaRPr lang="pt-BR" dirty="0"/>
+          </a:p>
+        </p:txBody>
+      </p:sp>
+      <p:sp>
+        <p:nvSpPr>
+          <p:cNvPr id="3" name="Espaço Reservado para Conteúdo 2"/>
+          <p:cNvSpPr>
+            <a:spLocks noGrp="1"/>
+          </p:cNvSpPr>
+          <p:nvPr>
+            <p:ph idx="1"/>
+          </p:nvPr>
+        </p:nvSpPr>
+        <p:spPr/>
+        <p:txBody>
+          <a:bodyPr/>
+          <a:lstStyle/>
+          <a:p>
+            <a:r>
+              <a:rPr lang="pt-BR" dirty="0" smtClean="0"/>
+              <a:t>Quando a propriedade </a:t>
+            </a:r>
+            <a:r>
+              <a:rPr lang="pt-BR" dirty="0" err="1" smtClean="0"/>
+              <a:t>readyState</a:t>
+            </a:r>
+            <a:r>
+              <a:rPr lang="pt-BR" dirty="0" smtClean="0"/>
+              <a:t> for 4 e o status for 200, a resposta estará pronta.</a:t>
+            </a:r>
+            <a:endParaRPr lang="pt-BR" dirty="0"/>
+          </a:p>
+        </p:txBody>
+      </p:sp>
+      <p:pic>
+        <p:nvPicPr>
+          <p:cNvPr id="5" name="Imagem 4"/>
+          <p:cNvPicPr>
+            <a:picLocks noChangeAspect="1"/>
+          </p:cNvPicPr>
+          <p:nvPr/>
+        </p:nvPicPr>
+        <p:blipFill>
+          <a:blip r:embed="rId3"/>
+          <a:stretch>
+            <a:fillRect/>
+          </a:stretch>
+        </p:blipFill>
+        <p:spPr>
+          <a:xfrm>
+            <a:off x="1154953" y="3390900"/>
+            <a:ext cx="7791450" cy="2628900"/>
+          </a:xfrm>
+          <a:prstGeom prst="rect">
+            <a:avLst/>
+          </a:prstGeom>
+        </p:spPr>
+      </p:pic>
+    </p:spTree>
+    <p:extLst>
+      <p:ext uri="{BB962C8B-B14F-4D97-AF65-F5344CB8AC3E}">
+        <p14:creationId xmlns:p14="http://schemas.microsoft.com/office/powerpoint/2010/main" val="954287039"/>
+      </p:ext>
+    </p:extLst>
+  </p:cSld>
+  <p:clrMapOvr>
+    <a:masterClrMapping/>
+  </p:clrMapOvr>
+</p:sld>
+</file>
+
+<file path=ppt/slides/slide16.xml><?xml version="1.0" encoding="utf-8"?>
+<p:sld xmlns:a="http://schemas.openxmlformats.org/drawingml/2006/main" xmlns:r="http://schemas.openxmlformats.org/officeDocument/2006/relationships" xmlns:p="http://schemas.openxmlformats.org/presentationml/2006/main">
+  <p:cSld>
+    <p:spTree>
+      <p:nvGrpSpPr>
+        <p:cNvPr id="1" name=""/>
+        <p:cNvGrpSpPr/>
+        <p:nvPr/>
+      </p:nvGrpSpPr>
+      <p:grpSpPr>
+        <a:xfrm>
+          <a:off x="0" y="0"/>
+          <a:ext cx="0" cy="0"/>
+          <a:chOff x="0" y="0"/>
+          <a:chExt cx="0" cy="0"/>
+        </a:xfrm>
+      </p:grpSpPr>
+      <p:sp>
+        <p:nvSpPr>
+          <p:cNvPr id="2" name="Título 1"/>
+          <p:cNvSpPr>
+            <a:spLocks noGrp="1"/>
+          </p:cNvSpPr>
+          <p:nvPr>
+            <p:ph type="title"/>
+          </p:nvPr>
+        </p:nvSpPr>
+        <p:spPr/>
+        <p:txBody>
+          <a:bodyPr/>
+          <a:lstStyle/>
+          <a:p>
+            <a:r>
+              <a:rPr lang="pt-BR" dirty="0" smtClean="0"/>
+              <a:t>Exemplo</a:t>
+            </a:r>
+            <a:endParaRPr lang="pt-BR" dirty="0"/>
+          </a:p>
+        </p:txBody>
+      </p:sp>
+      <p:sp>
+        <p:nvSpPr>
+          <p:cNvPr id="3" name="Espaço Reservado para Conteúdo 2"/>
+          <p:cNvSpPr>
+            <a:spLocks noGrp="1"/>
+          </p:cNvSpPr>
+          <p:nvPr>
+            <p:ph idx="1"/>
+          </p:nvPr>
+        </p:nvSpPr>
+        <p:spPr/>
+        <p:txBody>
+          <a:bodyPr/>
+          <a:lstStyle/>
+          <a:p>
+            <a:r>
+              <a:rPr lang="pt-BR" dirty="0" smtClean="0"/>
+              <a:t>A propriedade </a:t>
+            </a:r>
+            <a:r>
+              <a:rPr lang="pt-BR" dirty="0" err="1" smtClean="0"/>
+              <a:t>responseText</a:t>
+            </a:r>
+            <a:r>
+              <a:rPr lang="pt-BR" dirty="0" smtClean="0"/>
+              <a:t> retorna a resposta do servidor, e essa resposta pode ser usada para atualizar a pagina web.</a:t>
+            </a:r>
+            <a:endParaRPr lang="pt-BR" dirty="0"/>
+          </a:p>
+        </p:txBody>
+      </p:sp>
+      <p:pic>
+        <p:nvPicPr>
+          <p:cNvPr id="4" name="Imagem 3"/>
+          <p:cNvPicPr>
+            <a:picLocks noChangeAspect="1"/>
+          </p:cNvPicPr>
+          <p:nvPr/>
+        </p:nvPicPr>
+        <p:blipFill>
+          <a:blip r:embed="rId3"/>
+          <a:stretch>
+            <a:fillRect/>
+          </a:stretch>
+        </p:blipFill>
+        <p:spPr>
+          <a:xfrm>
+            <a:off x="1154953" y="3352800"/>
+            <a:ext cx="7962900" cy="2667000"/>
+          </a:xfrm>
+          <a:prstGeom prst="rect">
+            <a:avLst/>
+          </a:prstGeom>
+        </p:spPr>
+      </p:pic>
+    </p:spTree>
+    <p:extLst>
+      <p:ext uri="{BB962C8B-B14F-4D97-AF65-F5344CB8AC3E}">
+        <p14:creationId xmlns:p14="http://schemas.microsoft.com/office/powerpoint/2010/main" val="501184503"/>
+      </p:ext>
+    </p:extLst>
+  </p:cSld>
+  <p:clrMapOvr>
+    <a:masterClrMapping/>
+  </p:clrMapOvr>
+</p:sld>
+</file>
+
+<file path=ppt/slides/slide17.xml><?xml version="1.0" encoding="utf-8"?>
+<p:sld xmlns:a="http://schemas.openxmlformats.org/drawingml/2006/main" xmlns:r="http://schemas.openxmlformats.org/officeDocument/2006/relationships" xmlns:p="http://schemas.openxmlformats.org/presentationml/2006/main">
+  <p:cSld>
+    <p:spTree>
+      <p:nvGrpSpPr>
+        <p:cNvPr id="1" name=""/>
+        <p:cNvGrpSpPr/>
+        <p:nvPr/>
+      </p:nvGrpSpPr>
+      <p:grpSpPr>
+        <a:xfrm>
+          <a:off x="0" y="0"/>
+          <a:ext cx="0" cy="0"/>
+          <a:chOff x="0" y="0"/>
+          <a:chExt cx="0" cy="0"/>
+        </a:xfrm>
+      </p:grpSpPr>
+      <p:sp>
+        <p:nvSpPr>
+          <p:cNvPr id="2" name="Título 1"/>
+          <p:cNvSpPr>
+            <a:spLocks noGrp="1"/>
+          </p:cNvSpPr>
+          <p:nvPr>
+            <p:ph type="title"/>
+          </p:nvPr>
+        </p:nvSpPr>
+        <p:spPr/>
+        <p:txBody>
+          <a:bodyPr/>
+          <a:lstStyle/>
+          <a:p>
+            <a:r>
+              <a:rPr lang="pt-BR" dirty="0" smtClean="0"/>
+              <a:t>Exemplo</a:t>
+            </a:r>
+            <a:endParaRPr lang="pt-BR" dirty="0"/>
+          </a:p>
+        </p:txBody>
+      </p:sp>
+      <p:sp>
+        <p:nvSpPr>
+          <p:cNvPr id="3" name="Espaço Reservado para Conteúdo 2"/>
+          <p:cNvSpPr>
+            <a:spLocks noGrp="1"/>
+          </p:cNvSpPr>
+          <p:nvPr>
+            <p:ph idx="1"/>
+          </p:nvPr>
+        </p:nvSpPr>
+        <p:spPr/>
+        <p:txBody>
+          <a:bodyPr/>
+          <a:lstStyle/>
+          <a:p>
+            <a:r>
+              <a:rPr lang="pt-BR" dirty="0" smtClean="0"/>
+              <a:t>A propriedade </a:t>
+            </a:r>
+            <a:r>
+              <a:rPr lang="pt-BR" dirty="0" err="1" smtClean="0"/>
+              <a:t>responseText</a:t>
+            </a:r>
+            <a:r>
+              <a:rPr lang="pt-BR" dirty="0" smtClean="0"/>
+              <a:t> retorna a resposta do servidor, e essa resposta pode ser usada para atualizar a pagina web.</a:t>
+            </a:r>
+            <a:endParaRPr lang="pt-BR" dirty="0"/>
+          </a:p>
+        </p:txBody>
+      </p:sp>
+      <p:pic>
+        <p:nvPicPr>
+          <p:cNvPr id="4" name="Imagem 3"/>
+          <p:cNvPicPr>
+            <a:picLocks noChangeAspect="1"/>
+          </p:cNvPicPr>
+          <p:nvPr/>
+        </p:nvPicPr>
+        <p:blipFill>
+          <a:blip r:embed="rId3"/>
+          <a:stretch>
+            <a:fillRect/>
+          </a:stretch>
+        </p:blipFill>
+        <p:spPr>
+          <a:xfrm>
+            <a:off x="1154953" y="3352800"/>
+            <a:ext cx="7962900" cy="2667000"/>
+          </a:xfrm>
+          <a:prstGeom prst="rect">
+            <a:avLst/>
+          </a:prstGeom>
+        </p:spPr>
+      </p:pic>
+    </p:spTree>
+    <p:extLst>
+      <p:ext uri="{BB962C8B-B14F-4D97-AF65-F5344CB8AC3E}">
+        <p14:creationId xmlns:p14="http://schemas.microsoft.com/office/powerpoint/2010/main" val="3090892899"/>
+      </p:ext>
+    </p:extLst>
+  </p:cSld>
+  <p:clrMapOvr>
+    <a:masterClrMapping/>
+  </p:clrMapOvr>
+</p:sld>
+</file>
+
+<file path=ppt/slides/slide18.xml><?xml version="1.0" encoding="utf-8"?>
+<p:sld xmlns:a="http://schemas.openxmlformats.org/drawingml/2006/main" xmlns:r="http://schemas.openxmlformats.org/officeDocument/2006/relationships" xmlns:p="http://schemas.openxmlformats.org/presentationml/2006/main">
+  <p:cSld>
+    <p:spTree>
+      <p:nvGrpSpPr>
+        <p:cNvPr id="1" name=""/>
+        <p:cNvGrpSpPr/>
+        <p:nvPr/>
+      </p:nvGrpSpPr>
+      <p:grpSpPr>
+        <a:xfrm>
+          <a:off x="0" y="0"/>
+          <a:ext cx="0" cy="0"/>
+          <a:chOff x="0" y="0"/>
+          <a:chExt cx="0" cy="0"/>
+        </a:xfrm>
+      </p:grpSpPr>
+      <p:sp>
+        <p:nvSpPr>
+          <p:cNvPr id="2" name="CaixaDeTexto 1"/>
+          <p:cNvSpPr txBox="1"/>
+          <p:nvPr/>
+        </p:nvSpPr>
+        <p:spPr>
+          <a:xfrm>
+            <a:off x="3031958" y="2630905"/>
+            <a:ext cx="5967663" cy="1323439"/>
+          </a:xfrm>
+          <a:prstGeom prst="rect">
+            <a:avLst/>
+          </a:prstGeom>
+          <a:noFill/>
+        </p:spPr>
+        <p:txBody>
+          <a:bodyPr wrap="square" rtlCol="0">
+            <a:spAutoFit/>
+          </a:bodyPr>
+          <a:lstStyle/>
+          <a:p>
+            <a:pPr algn="ctr"/>
+            <a:r>
+              <a:rPr lang="pt-BR" sz="8000" dirty="0" smtClean="0">
+                <a:solidFill>
+                  <a:schemeClr val="bg2">
+                    <a:lumMod val="25000"/>
+                  </a:schemeClr>
+                </a:solidFill>
+                <a:latin typeface="Roboto" pitchFamily="2" charset="0"/>
+                <a:ea typeface="Roboto" pitchFamily="2" charset="0"/>
+              </a:rPr>
+              <a:t>OBRIGADO!!!</a:t>
+            </a:r>
+            <a:endParaRPr lang="pt-BR" sz="8000" dirty="0">
+              <a:solidFill>
+                <a:schemeClr val="bg2">
+                  <a:lumMod val="25000"/>
+                </a:schemeClr>
+              </a:solidFill>
+              <a:latin typeface="Roboto" pitchFamily="2" charset="0"/>
+              <a:ea typeface="Roboto" pitchFamily="2" charset="0"/>
+            </a:endParaRPr>
+          </a:p>
+        </p:txBody>
+      </p:sp>
+    </p:spTree>
+    <p:extLst>
+      <p:ext uri="{BB962C8B-B14F-4D97-AF65-F5344CB8AC3E}">
+        <p14:creationId xmlns:p14="http://schemas.microsoft.com/office/powerpoint/2010/main" val="2124186504"/>
       </p:ext>
     </p:extLst>
   </p:cSld>

</xml_diff>